<commit_message>
Small fixes and name changes.
</commit_message>
<xml_diff>
--- a/Projektet/Designspecifikation/Sitemap_djupviken.pptx
+++ b/Projektet/Designspecifikation/Sitemap_djupviken.pptx
@@ -104,6 +104,11 @@
       </a:defRPr>
     </a:lvl9pPr>
   </p:defaultTextStyle>
+  <p:extLst>
+    <p:ext uri="{EFAFB233-063F-42B5-8137-9DF3F51BA10A}">
+      <p15:sldGuideLst xmlns:p15="http://schemas.microsoft.com/office/powerpoint/2012/main"/>
+    </p:ext>
+  </p:extLst>
 </p:presentation>
 </file>
 
@@ -256,7 +261,7 @@
           <a:p>
             <a:fld id="{617D1546-209F-4322-BDCF-08B98A0C2003}" type="datetimeFigureOut">
               <a:rPr lang="en-SE" smtClean="0"/>
-              <a:t>2021-07-23</a:t>
+              <a:t>2021-07-25</a:t>
             </a:fld>
             <a:endParaRPr lang="en-SE"/>
           </a:p>
@@ -456,7 +461,7 @@
           <a:p>
             <a:fld id="{617D1546-209F-4322-BDCF-08B98A0C2003}" type="datetimeFigureOut">
               <a:rPr lang="en-SE" smtClean="0"/>
-              <a:t>2021-07-23</a:t>
+              <a:t>2021-07-25</a:t>
             </a:fld>
             <a:endParaRPr lang="en-SE"/>
           </a:p>
@@ -666,7 +671,7 @@
           <a:p>
             <a:fld id="{617D1546-209F-4322-BDCF-08B98A0C2003}" type="datetimeFigureOut">
               <a:rPr lang="en-SE" smtClean="0"/>
-              <a:t>2021-07-23</a:t>
+              <a:t>2021-07-25</a:t>
             </a:fld>
             <a:endParaRPr lang="en-SE"/>
           </a:p>
@@ -866,7 +871,7 @@
           <a:p>
             <a:fld id="{617D1546-209F-4322-BDCF-08B98A0C2003}" type="datetimeFigureOut">
               <a:rPr lang="en-SE" smtClean="0"/>
-              <a:t>2021-07-23</a:t>
+              <a:t>2021-07-25</a:t>
             </a:fld>
             <a:endParaRPr lang="en-SE"/>
           </a:p>
@@ -1142,7 +1147,7 @@
           <a:p>
             <a:fld id="{617D1546-209F-4322-BDCF-08B98A0C2003}" type="datetimeFigureOut">
               <a:rPr lang="en-SE" smtClean="0"/>
-              <a:t>2021-07-23</a:t>
+              <a:t>2021-07-25</a:t>
             </a:fld>
             <a:endParaRPr lang="en-SE"/>
           </a:p>
@@ -1410,7 +1415,7 @@
           <a:p>
             <a:fld id="{617D1546-209F-4322-BDCF-08B98A0C2003}" type="datetimeFigureOut">
               <a:rPr lang="en-SE" smtClean="0"/>
-              <a:t>2021-07-23</a:t>
+              <a:t>2021-07-25</a:t>
             </a:fld>
             <a:endParaRPr lang="en-SE"/>
           </a:p>
@@ -1825,7 +1830,7 @@
           <a:p>
             <a:fld id="{617D1546-209F-4322-BDCF-08B98A0C2003}" type="datetimeFigureOut">
               <a:rPr lang="en-SE" smtClean="0"/>
-              <a:t>2021-07-23</a:t>
+              <a:t>2021-07-25</a:t>
             </a:fld>
             <a:endParaRPr lang="en-SE"/>
           </a:p>
@@ -1967,7 +1972,7 @@
           <a:p>
             <a:fld id="{617D1546-209F-4322-BDCF-08B98A0C2003}" type="datetimeFigureOut">
               <a:rPr lang="en-SE" smtClean="0"/>
-              <a:t>2021-07-23</a:t>
+              <a:t>2021-07-25</a:t>
             </a:fld>
             <a:endParaRPr lang="en-SE"/>
           </a:p>
@@ -2080,7 +2085,7 @@
           <a:p>
             <a:fld id="{617D1546-209F-4322-BDCF-08B98A0C2003}" type="datetimeFigureOut">
               <a:rPr lang="en-SE" smtClean="0"/>
-              <a:t>2021-07-23</a:t>
+              <a:t>2021-07-25</a:t>
             </a:fld>
             <a:endParaRPr lang="en-SE"/>
           </a:p>
@@ -2393,7 +2398,7 @@
           <a:p>
             <a:fld id="{617D1546-209F-4322-BDCF-08B98A0C2003}" type="datetimeFigureOut">
               <a:rPr lang="en-SE" smtClean="0"/>
-              <a:t>2021-07-23</a:t>
+              <a:t>2021-07-25</a:t>
             </a:fld>
             <a:endParaRPr lang="en-SE"/>
           </a:p>
@@ -2682,7 +2687,7 @@
           <a:p>
             <a:fld id="{617D1546-209F-4322-BDCF-08B98A0C2003}" type="datetimeFigureOut">
               <a:rPr lang="en-SE" smtClean="0"/>
-              <a:t>2021-07-23</a:t>
+              <a:t>2021-07-25</a:t>
             </a:fld>
             <a:endParaRPr lang="en-SE"/>
           </a:p>
@@ -2925,7 +2930,7 @@
           <a:p>
             <a:fld id="{617D1546-209F-4322-BDCF-08B98A0C2003}" type="datetimeFigureOut">
               <a:rPr lang="en-SE" smtClean="0"/>
-              <a:t>2021-07-23</a:t>
+              <a:t>2021-07-25</a:t>
             </a:fld>
             <a:endParaRPr lang="en-SE"/>
           </a:p>
@@ -3393,12 +3398,12 @@
           <a:p>
             <a:pPr algn="ctr"/>
             <a:r>
-              <a:rPr lang="en-GB" sz="1200" dirty="0" err="1">
+              <a:rPr lang="en-GB" sz="1200">
                 <a:solidFill>
                   <a:schemeClr val="tx1"/>
                 </a:solidFill>
               </a:rPr>
-              <a:t>Djupviken</a:t>
+              <a:t>Djupvik</a:t>
             </a:r>
             <a:endParaRPr lang="en-SE" sz="1200" dirty="0">
               <a:solidFill>
@@ -3464,7 +3469,7 @@
                   <a:schemeClr val="tx1"/>
                 </a:solidFill>
               </a:rPr>
-              <a:t>Gästplatser</a:t>
+              <a:t>Gästhamn</a:t>
             </a:r>
             <a:endParaRPr lang="en-SE" sz="1200" dirty="0">
               <a:solidFill>

</xml_diff>